<commit_message>
edits part 2 090221
</commit_message>
<xml_diff>
--- a/docs/images/nasa-ammos-smallsat-toolkit-architecture-diagram.pptx
+++ b/docs/images/nasa-ammos-smallsat-toolkit-architecture-diagram.pptx
@@ -3198,7 +3198,7 @@
           <a:blip r:embed="rId2">
             <a:extLst>
               <a:ext uri="{96DAC541-7B7A-43D3-8B79-37D633B846F1}">
-                <asvg:svgBlip xmlns="" xmlns:asvg="http://schemas.microsoft.com/office/drawing/2016/SVG/main" r:embed="rId3"/>
+                <asvg:svgBlip xmlns:asvg="http://schemas.microsoft.com/office/drawing/2016/SVG/main" xmlns="" r:embed="rId3"/>
               </a:ext>
             </a:extLst>
           </a:blip>
@@ -3233,7 +3233,7 @@
           <a:blip r:embed="rId4">
             <a:extLst>
               <a:ext uri="{96DAC541-7B7A-43D3-8B79-37D633B846F1}">
-                <asvg:svgBlip xmlns="" xmlns:asvg="http://schemas.microsoft.com/office/drawing/2016/SVG/main" r:embed="rId17"/>
+                <asvg:svgBlip xmlns:asvg="http://schemas.microsoft.com/office/drawing/2016/SVG/main" xmlns="" r:embed="rId17"/>
               </a:ext>
             </a:extLst>
           </a:blip>
@@ -3269,7 +3269,7 @@
           <a:blip r:embed="rId18">
             <a:extLst>
               <a:ext uri="{96DAC541-7B7A-43D3-8B79-37D633B846F1}">
-                <asvg:svgBlip xmlns="" xmlns:asvg="http://schemas.microsoft.com/office/drawing/2016/SVG/main" r:embed="rId19"/>
+                <asvg:svgBlip xmlns:asvg="http://schemas.microsoft.com/office/drawing/2016/SVG/main" xmlns="" r:embed="rId19"/>
               </a:ext>
             </a:extLst>
           </a:blip>
@@ -3377,7 +3377,7 @@
           <a:blip r:embed="rId20">
             <a:extLst>
               <a:ext uri="{96DAC541-7B7A-43D3-8B79-37D633B846F1}">
-                <asvg:svgBlip xmlns="" xmlns:asvg="http://schemas.microsoft.com/office/drawing/2016/SVG/main" r:embed="rId21"/>
+                <asvg:svgBlip xmlns:asvg="http://schemas.microsoft.com/office/drawing/2016/SVG/main" xmlns="" r:embed="rId21"/>
               </a:ext>
             </a:extLst>
           </a:blip>
@@ -3579,7 +3579,7 @@
           <a:blip r:embed="rId23">
             <a:extLst>
               <a:ext uri="{96DAC541-7B7A-43D3-8B79-37D633B846F1}">
-                <asvg:svgBlip xmlns="" xmlns:asvg="http://schemas.microsoft.com/office/drawing/2016/SVG/main" r:embed="rId24"/>
+                <asvg:svgBlip xmlns:asvg="http://schemas.microsoft.com/office/drawing/2016/SVG/main" xmlns="" r:embed="rId24"/>
               </a:ext>
             </a:extLst>
           </a:blip>
@@ -3756,12 +3756,12 @@
               <a:t>AIT server and </a:t>
             </a:r>
             <a:r>
-              <a:rPr lang="en-US" altLang="en-US" sz="1200" dirty="0" err="1" smtClean="0">
+              <a:rPr lang="en-US" altLang="en-US" sz="1200" dirty="0" smtClean="0">
                 <a:latin typeface="Arial" panose="020B0604020202020204" pitchFamily="34" charset="0"/>
                 <a:ea typeface="Amazon Ember" panose="020B0603020204020204" pitchFamily="34" charset="0"/>
                 <a:cs typeface="Arial" panose="020B0604020202020204" pitchFamily="34" charset="0"/>
               </a:rPr>
-              <a:t>OpenMCT</a:t>
+              <a:t>Open MCT</a:t>
             </a:r>
             <a:endParaRPr lang="en-US" altLang="en-US" sz="1200" dirty="0">
               <a:latin typeface="Arial" panose="020B0604020202020204" pitchFamily="34" charset="0"/>
@@ -4323,7 +4323,7 @@
           <a:blip r:embed="rId18">
             <a:extLst>
               <a:ext uri="{96DAC541-7B7A-43D3-8B79-37D633B846F1}">
-                <asvg:svgBlip xmlns="" xmlns:asvg="http://schemas.microsoft.com/office/drawing/2016/SVG/main" r:embed="rId19"/>
+                <asvg:svgBlip xmlns:asvg="http://schemas.microsoft.com/office/drawing/2016/SVG/main" xmlns="" r:embed="rId19"/>
               </a:ext>
             </a:extLst>
           </a:blip>
@@ -4431,7 +4431,7 @@
           <a:blip r:embed="rId20">
             <a:extLst>
               <a:ext uri="{96DAC541-7B7A-43D3-8B79-37D633B846F1}">
-                <asvg:svgBlip xmlns="" xmlns:asvg="http://schemas.microsoft.com/office/drawing/2016/SVG/main" r:embed="rId21"/>
+                <asvg:svgBlip xmlns:asvg="http://schemas.microsoft.com/office/drawing/2016/SVG/main" xmlns="" r:embed="rId21"/>
               </a:ext>
             </a:extLst>
           </a:blip>
@@ -4668,12 +4668,12 @@
               <a:t>AIT server and </a:t>
             </a:r>
             <a:r>
-              <a:rPr lang="en-US" altLang="en-US" sz="1200" dirty="0" err="1" smtClean="0">
+              <a:rPr lang="en-US" altLang="en-US" sz="1200" dirty="0" smtClean="0">
                 <a:latin typeface="Arial" panose="020B0604020202020204" pitchFamily="34" charset="0"/>
                 <a:ea typeface="Amazon Ember" panose="020B0603020204020204" pitchFamily="34" charset="0"/>
                 <a:cs typeface="Arial" panose="020B0604020202020204" pitchFamily="34" charset="0"/>
               </a:rPr>
-              <a:t>OpenMCT</a:t>
+              <a:t>Open MCT</a:t>
             </a:r>
             <a:endParaRPr lang="en-US" altLang="en-US" sz="1200" dirty="0">
               <a:latin typeface="Arial" panose="020B0604020202020204" pitchFamily="34" charset="0"/>
@@ -5937,7 +5937,7 @@
           <a:blip r:embed="rId23">
             <a:extLst>
               <a:ext uri="{96DAC541-7B7A-43D3-8B79-37D633B846F1}">
-                <asvg:svgBlip xmlns="" xmlns:asvg="http://schemas.microsoft.com/office/drawing/2016/SVG/main" r:embed="rId24"/>
+                <asvg:svgBlip xmlns:asvg="http://schemas.microsoft.com/office/drawing/2016/SVG/main" xmlns="" r:embed="rId24"/>
               </a:ext>
             </a:extLst>
           </a:blip>

</xml_diff>

<commit_message>
Edited overview per JPL + changed Elasticsearch to OpenSearch per name change
</commit_message>
<xml_diff>
--- a/docs/images/nasa-ammos-smallsat-toolkit-architecture-diagram.pptx
+++ b/docs/images/nasa-ammos-smallsat-toolkit-architecture-diagram.pptx
@@ -260,7 +260,7 @@
           <a:p>
             <a:fld id="{CD4867BA-9107-4E6F-9EA9-0922E06396EE}" type="datetimeFigureOut">
               <a:rPr lang="en-US" smtClean="0"/>
-              <a:t>9/7/2021</a:t>
+              <a:t>9/9/2021</a:t>
             </a:fld>
             <a:endParaRPr lang="en-US" dirty="0"/>
           </a:p>
@@ -430,7 +430,7 @@
           <a:p>
             <a:fld id="{CD4867BA-9107-4E6F-9EA9-0922E06396EE}" type="datetimeFigureOut">
               <a:rPr lang="en-US" smtClean="0"/>
-              <a:t>9/7/2021</a:t>
+              <a:t>9/9/2021</a:t>
             </a:fld>
             <a:endParaRPr lang="en-US" dirty="0"/>
           </a:p>
@@ -610,7 +610,7 @@
           <a:p>
             <a:fld id="{CD4867BA-9107-4E6F-9EA9-0922E06396EE}" type="datetimeFigureOut">
               <a:rPr lang="en-US" smtClean="0"/>
-              <a:t>9/7/2021</a:t>
+              <a:t>9/9/2021</a:t>
             </a:fld>
             <a:endParaRPr lang="en-US" dirty="0"/>
           </a:p>
@@ -780,7 +780,7 @@
           <a:p>
             <a:fld id="{CD4867BA-9107-4E6F-9EA9-0922E06396EE}" type="datetimeFigureOut">
               <a:rPr lang="en-US" smtClean="0"/>
-              <a:t>9/7/2021</a:t>
+              <a:t>9/9/2021</a:t>
             </a:fld>
             <a:endParaRPr lang="en-US" dirty="0"/>
           </a:p>
@@ -1026,7 +1026,7 @@
           <a:p>
             <a:fld id="{CD4867BA-9107-4E6F-9EA9-0922E06396EE}" type="datetimeFigureOut">
               <a:rPr lang="en-US" smtClean="0"/>
-              <a:t>9/7/2021</a:t>
+              <a:t>9/9/2021</a:t>
             </a:fld>
             <a:endParaRPr lang="en-US" dirty="0"/>
           </a:p>
@@ -1258,7 +1258,7 @@
           <a:p>
             <a:fld id="{CD4867BA-9107-4E6F-9EA9-0922E06396EE}" type="datetimeFigureOut">
               <a:rPr lang="en-US" smtClean="0"/>
-              <a:t>9/7/2021</a:t>
+              <a:t>9/9/2021</a:t>
             </a:fld>
             <a:endParaRPr lang="en-US" dirty="0"/>
           </a:p>
@@ -1625,7 +1625,7 @@
           <a:p>
             <a:fld id="{CD4867BA-9107-4E6F-9EA9-0922E06396EE}" type="datetimeFigureOut">
               <a:rPr lang="en-US" smtClean="0"/>
-              <a:t>9/7/2021</a:t>
+              <a:t>9/9/2021</a:t>
             </a:fld>
             <a:endParaRPr lang="en-US" dirty="0"/>
           </a:p>
@@ -1743,7 +1743,7 @@
           <a:p>
             <a:fld id="{CD4867BA-9107-4E6F-9EA9-0922E06396EE}" type="datetimeFigureOut">
               <a:rPr lang="en-US" smtClean="0"/>
-              <a:t>9/7/2021</a:t>
+              <a:t>9/9/2021</a:t>
             </a:fld>
             <a:endParaRPr lang="en-US" dirty="0"/>
           </a:p>
@@ -1838,7 +1838,7 @@
           <a:p>
             <a:fld id="{CD4867BA-9107-4E6F-9EA9-0922E06396EE}" type="datetimeFigureOut">
               <a:rPr lang="en-US" smtClean="0"/>
-              <a:t>9/7/2021</a:t>
+              <a:t>9/9/2021</a:t>
             </a:fld>
             <a:endParaRPr lang="en-US" dirty="0"/>
           </a:p>
@@ -2115,7 +2115,7 @@
           <a:p>
             <a:fld id="{CD4867BA-9107-4E6F-9EA9-0922E06396EE}" type="datetimeFigureOut">
               <a:rPr lang="en-US" smtClean="0"/>
-              <a:t>9/7/2021</a:t>
+              <a:t>9/9/2021</a:t>
             </a:fld>
             <a:endParaRPr lang="en-US" dirty="0"/>
           </a:p>
@@ -2372,7 +2372,7 @@
           <a:p>
             <a:fld id="{CD4867BA-9107-4E6F-9EA9-0922E06396EE}" type="datetimeFigureOut">
               <a:rPr lang="en-US" smtClean="0"/>
-              <a:t>9/7/2021</a:t>
+              <a:t>9/9/2021</a:t>
             </a:fld>
             <a:endParaRPr lang="en-US" dirty="0"/>
           </a:p>
@@ -2585,7 +2585,7 @@
           <a:p>
             <a:fld id="{CD4867BA-9107-4E6F-9EA9-0922E06396EE}" type="datetimeFigureOut">
               <a:rPr lang="en-US" smtClean="0"/>
-              <a:t>9/7/2021</a:t>
+              <a:t>9/9/2021</a:t>
             </a:fld>
             <a:endParaRPr lang="en-US" dirty="0"/>
           </a:p>
@@ -6137,7 +6137,7 @@
         <p:spPr bwMode="auto">
           <a:xfrm>
             <a:off x="14022773" y="4014471"/>
-            <a:ext cx="1713298" cy="276999"/>
+            <a:ext cx="1713298" cy="461665"/>
           </a:xfrm>
           <a:prstGeom prst="rect">
             <a:avLst/>
@@ -6271,20 +6271,27 @@
           <a:p>
             <a:pPr algn="ctr" eaLnBrk="1" hangingPunct="1"/>
             <a:r>
-              <a:rPr lang="en-US" altLang="en-US" sz="1200" dirty="0">
+              <a:rPr lang="en-US" altLang="en-US" sz="1200" dirty="0" smtClean="0">
                 <a:latin typeface="Arial" panose="020B0604020202020204" pitchFamily="34" charset="0"/>
                 <a:ea typeface="Amazon Ember" panose="020B0603020204020204" pitchFamily="34" charset="0"/>
                 <a:cs typeface="Arial" panose="020B0604020202020204" pitchFamily="34" charset="0"/>
               </a:rPr>
-              <a:t>Amazon </a:t>
+              <a:t>OpenSearch</a:t>
             </a:r>
+            <a:br>
+              <a:rPr lang="en-US" altLang="en-US" sz="1200" dirty="0" smtClean="0">
+                <a:latin typeface="Arial" panose="020B0604020202020204" pitchFamily="34" charset="0"/>
+                <a:ea typeface="Amazon Ember" panose="020B0603020204020204" pitchFamily="34" charset="0"/>
+                <a:cs typeface="Arial" panose="020B0604020202020204" pitchFamily="34" charset="0"/>
+              </a:rPr>
+            </a:br>
             <a:r>
               <a:rPr lang="en-US" altLang="en-US" sz="1200" dirty="0" smtClean="0">
                 <a:latin typeface="Arial" panose="020B0604020202020204" pitchFamily="34" charset="0"/>
                 <a:ea typeface="Amazon Ember" panose="020B0603020204020204" pitchFamily="34" charset="0"/>
                 <a:cs typeface="Arial" panose="020B0604020202020204" pitchFamily="34" charset="0"/>
               </a:rPr>
-              <a:t>ES</a:t>
+              <a:t>Service</a:t>
             </a:r>
             <a:endParaRPr lang="en-US" altLang="en-US" sz="1200" dirty="0">
               <a:latin typeface="Arial" panose="020B0604020202020204" pitchFamily="34" charset="0"/>

</xml_diff>